<commit_message>
Timeline/Distribution of Work Changes
-Dates on events on timeline
*Changed calendar to start weeks on Sunday
+Individual month screen shots
*Updated ppt to include current timeline/DOW
</commit_message>
<xml_diff>
--- a/Briefings/Briefing4.pptx
+++ b/Briefings/Briefing4.pptx
@@ -7,6 +7,12 @@
   <p:sldIdLst>
     <p:sldId id="256" r:id="rId2"/>
     <p:sldId id="257" r:id="rId3"/>
+    <p:sldId id="258" r:id="rId4"/>
+    <p:sldId id="259" r:id="rId5"/>
+    <p:sldId id="260" r:id="rId6"/>
+    <p:sldId id="263" r:id="rId7"/>
+    <p:sldId id="261" r:id="rId8"/>
+    <p:sldId id="262" r:id="rId9"/>
   </p:sldIdLst>
   <p:sldSz cx="9144000" cy="6858000" type="screen4x3"/>
   <p:notesSz cx="6858000" cy="9144000"/>
@@ -316,7 +322,7 @@
             <a:fld id="{542ED6D8-967B-4FDD-8539-23116DD8CE38}" type="datetimeFigureOut">
               <a:rPr lang="en-US" smtClean="0"/>
               <a:pPr/>
-              <a:t>11/7/2014</a:t>
+              <a:t>11/8/2014</a:t>
             </a:fld>
             <a:endParaRPr lang="en-US"/>
           </a:p>
@@ -512,7 +518,7 @@
             <a:fld id="{542ED6D8-967B-4FDD-8539-23116DD8CE38}" type="datetimeFigureOut">
               <a:rPr lang="en-US" smtClean="0"/>
               <a:pPr/>
-              <a:t>11/7/2014</a:t>
+              <a:t>11/8/2014</a:t>
             </a:fld>
             <a:endParaRPr lang="en-US"/>
           </a:p>
@@ -702,7 +708,7 @@
             <a:fld id="{542ED6D8-967B-4FDD-8539-23116DD8CE38}" type="datetimeFigureOut">
               <a:rPr lang="en-US" smtClean="0"/>
               <a:pPr/>
-              <a:t>11/7/2014</a:t>
+              <a:t>11/8/2014</a:t>
             </a:fld>
             <a:endParaRPr lang="en-US"/>
           </a:p>
@@ -933,7 +939,7 @@
             <a:fld id="{542ED6D8-967B-4FDD-8539-23116DD8CE38}" type="datetimeFigureOut">
               <a:rPr lang="en-US" smtClean="0"/>
               <a:pPr/>
-              <a:t>11/7/2014</a:t>
+              <a:t>11/8/2014</a:t>
             </a:fld>
             <a:endParaRPr lang="en-US"/>
           </a:p>
@@ -1216,7 +1222,7 @@
             <a:fld id="{542ED6D8-967B-4FDD-8539-23116DD8CE38}" type="datetimeFigureOut">
               <a:rPr lang="en-US" smtClean="0"/>
               <a:pPr/>
-              <a:t>11/7/2014</a:t>
+              <a:t>11/8/2014</a:t>
             </a:fld>
             <a:endParaRPr lang="en-US"/>
           </a:p>
@@ -1506,7 +1512,7 @@
             <a:fld id="{542ED6D8-967B-4FDD-8539-23116DD8CE38}" type="datetimeFigureOut">
               <a:rPr lang="en-US" smtClean="0"/>
               <a:pPr/>
-              <a:t>11/7/2014</a:t>
+              <a:t>11/8/2014</a:t>
             </a:fld>
             <a:endParaRPr lang="en-US"/>
           </a:p>
@@ -2062,7 +2068,7 @@
             <a:fld id="{542ED6D8-967B-4FDD-8539-23116DD8CE38}" type="datetimeFigureOut">
               <a:rPr lang="en-US" smtClean="0"/>
               <a:pPr/>
-              <a:t>11/7/2014</a:t>
+              <a:t>11/8/2014</a:t>
             </a:fld>
             <a:endParaRPr lang="en-US"/>
           </a:p>
@@ -2195,7 +2201,7 @@
             <a:fld id="{542ED6D8-967B-4FDD-8539-23116DD8CE38}" type="datetimeFigureOut">
               <a:rPr lang="en-US" smtClean="0"/>
               <a:pPr/>
-              <a:t>11/7/2014</a:t>
+              <a:t>11/8/2014</a:t>
             </a:fld>
             <a:endParaRPr lang="en-US"/>
           </a:p>
@@ -2347,7 +2353,7 @@
             <a:fld id="{542ED6D8-967B-4FDD-8539-23116DD8CE38}" type="datetimeFigureOut">
               <a:rPr lang="en-US" smtClean="0"/>
               <a:pPr/>
-              <a:t>11/7/2014</a:t>
+              <a:t>11/8/2014</a:t>
             </a:fld>
             <a:endParaRPr lang="en-US"/>
           </a:p>
@@ -2670,7 +2676,7 @@
             <a:fld id="{542ED6D8-967B-4FDD-8539-23116DD8CE38}" type="datetimeFigureOut">
               <a:rPr lang="en-US" smtClean="0"/>
               <a:pPr/>
-              <a:t>11/7/2014</a:t>
+              <a:t>11/8/2014</a:t>
             </a:fld>
             <a:endParaRPr lang="en-US"/>
           </a:p>
@@ -2969,7 +2975,7 @@
             <a:fld id="{542ED6D8-967B-4FDD-8539-23116DD8CE38}" type="datetimeFigureOut">
               <a:rPr lang="en-US" smtClean="0"/>
               <a:pPr/>
-              <a:t>11/7/2014</a:t>
+              <a:t>11/8/2014</a:t>
             </a:fld>
             <a:endParaRPr lang="en-US"/>
           </a:p>
@@ -3216,7 +3222,7 @@
             <a:fld id="{542ED6D8-967B-4FDD-8539-23116DD8CE38}" type="datetimeFigureOut">
               <a:rPr lang="en-US" smtClean="0"/>
               <a:pPr/>
-              <a:t>11/7/2014</a:t>
+              <a:t>11/8/2014</a:t>
             </a:fld>
             <a:endParaRPr lang="en-US"/>
           </a:p>
@@ -3850,7 +3856,7 @@
       </p:sp>
       <p:pic>
         <p:nvPicPr>
-          <p:cNvPr id="6" name="Content Placeholder 5" descr="Timeline.png"/>
+          <p:cNvPr id="5" name="Content Placeholder 4" descr="Timeline.png"/>
           <p:cNvPicPr>
             <a:picLocks noGrp="1" noChangeAspect="1"/>
           </p:cNvPicPr>
@@ -3866,9 +3872,382 @@
         </p:blipFill>
         <p:spPr>
           <a:xfrm>
-            <a:off x="0" y="2209801"/>
-            <a:ext cx="9144000" cy="2664836"/>
-          </a:xfrm>
+            <a:off x="0" y="2209800"/>
+            <a:ext cx="9144000" cy="2971800"/>
+          </a:xfrm>
+        </p:spPr>
+      </p:pic>
+    </p:spTree>
+  </p:cSld>
+  <p:clrMapOvr>
+    <a:masterClrMapping/>
+  </p:clrMapOvr>
+  <p:timing>
+    <p:tnLst>
+      <p:par>
+        <p:cTn id="1" dur="indefinite" restart="never" nodeType="tmRoot"/>
+      </p:par>
+    </p:tnLst>
+  </p:timing>
+</p:sld>
+</file>
+
+<file path=ppt/slides/slide3.xml><?xml version="1.0" encoding="utf-8"?>
+<p:sld xmlns:a="http://schemas.openxmlformats.org/drawingml/2006/main" xmlns:r="http://schemas.openxmlformats.org/officeDocument/2006/relationships" xmlns:p="http://schemas.openxmlformats.org/presentationml/2006/main">
+  <p:cSld>
+    <p:spTree>
+      <p:nvGrpSpPr>
+        <p:cNvPr id="1" name=""/>
+        <p:cNvGrpSpPr/>
+        <p:nvPr/>
+      </p:nvGrpSpPr>
+      <p:grpSpPr>
+        <a:xfrm>
+          <a:off x="0" y="0"/>
+          <a:ext cx="0" cy="0"/>
+          <a:chOff x="0" y="0"/>
+          <a:chExt cx="0" cy="0"/>
+        </a:xfrm>
+      </p:grpSpPr>
+      <p:sp>
+        <p:nvSpPr>
+          <p:cNvPr id="2" name="Title 1"/>
+          <p:cNvSpPr>
+            <a:spLocks noGrp="1"/>
+          </p:cNvSpPr>
+          <p:nvPr>
+            <p:ph type="title"/>
+          </p:nvPr>
+        </p:nvSpPr>
+        <p:spPr/>
+        <p:txBody>
+          <a:bodyPr/>
+          <a:lstStyle/>
+          <a:p>
+            <a:pPr algn="ctr"/>
+            <a:r>
+              <a:rPr lang="en-US" dirty="0" smtClean="0"/>
+              <a:t>Distribution of Work</a:t>
+            </a:r>
+            <a:endParaRPr lang="en-US" dirty="0"/>
+          </a:p>
+        </p:txBody>
+      </p:sp>
+      <p:pic>
+        <p:nvPicPr>
+          <p:cNvPr id="1029" name="Picture 5" descr="C:\Users\Stacy\AppData\Local\Microsoft\Windows\INetCache\IE\PKMO0XFI\MP900414051[1].jpg"/>
+          <p:cNvPicPr>
+            <a:picLocks noChangeAspect="1" noChangeArrowheads="1"/>
+          </p:cNvPicPr>
+          <p:nvPr/>
+        </p:nvPicPr>
+        <p:blipFill>
+          <a:blip r:embed="rId2" cstate="print"/>
+          <a:srcRect/>
+          <a:stretch>
+            <a:fillRect/>
+          </a:stretch>
+        </p:blipFill>
+        <p:spPr bwMode="auto">
+          <a:xfrm>
+            <a:off x="1981200" y="2414350"/>
+            <a:ext cx="5181600" cy="3453050"/>
+          </a:xfrm>
+          <a:prstGeom prst="rect">
+            <a:avLst/>
+          </a:prstGeom>
+          <a:ln w="228600" cap="sq" cmpd="thickThin">
+            <a:solidFill>
+              <a:srgbClr val="000000"/>
+            </a:solidFill>
+            <a:prstDash val="solid"/>
+            <a:miter lim="800000"/>
+          </a:ln>
+          <a:effectLst>
+            <a:innerShdw blurRad="76200">
+              <a:srgbClr val="000000"/>
+            </a:innerShdw>
+          </a:effectLst>
+        </p:spPr>
+      </p:pic>
+    </p:spTree>
+  </p:cSld>
+  <p:clrMapOvr>
+    <a:masterClrMapping/>
+  </p:clrMapOvr>
+  <p:timing>
+    <p:tnLst>
+      <p:par>
+        <p:cTn id="1" dur="indefinite" restart="never" nodeType="tmRoot"/>
+      </p:par>
+    </p:tnLst>
+  </p:timing>
+</p:sld>
+</file>
+
+<file path=ppt/slides/slide4.xml><?xml version="1.0" encoding="utf-8"?>
+<p:sld xmlns:a="http://schemas.openxmlformats.org/drawingml/2006/main" xmlns:r="http://schemas.openxmlformats.org/officeDocument/2006/relationships" xmlns:p="http://schemas.openxmlformats.org/presentationml/2006/main">
+  <p:cSld>
+    <p:spTree>
+      <p:nvGrpSpPr>
+        <p:cNvPr id="1" name=""/>
+        <p:cNvGrpSpPr/>
+        <p:nvPr/>
+      </p:nvGrpSpPr>
+      <p:grpSpPr>
+        <a:xfrm>
+          <a:off x="0" y="0"/>
+          <a:ext cx="0" cy="0"/>
+          <a:chOff x="0" y="0"/>
+          <a:chExt cx="0" cy="0"/>
+        </a:xfrm>
+      </p:grpSpPr>
+      <p:pic>
+        <p:nvPicPr>
+          <p:cNvPr id="2" name="Picture 1" descr="November.png"/>
+          <p:cNvPicPr>
+            <a:picLocks noChangeAspect="1"/>
+          </p:cNvPicPr>
+          <p:nvPr/>
+        </p:nvPicPr>
+        <p:blipFill>
+          <a:blip r:embed="rId2" cstate="print"/>
+          <a:stretch>
+            <a:fillRect/>
+          </a:stretch>
+        </p:blipFill>
+        <p:spPr>
+          <a:xfrm>
+            <a:off x="0" y="0"/>
+            <a:ext cx="9220200" cy="7010400"/>
+          </a:xfrm>
+          <a:prstGeom prst="rect">
+            <a:avLst/>
+          </a:prstGeom>
+        </p:spPr>
+      </p:pic>
+    </p:spTree>
+  </p:cSld>
+  <p:clrMapOvr>
+    <a:masterClrMapping/>
+  </p:clrMapOvr>
+  <p:timing>
+    <p:tnLst>
+      <p:par>
+        <p:cTn id="1" dur="indefinite" restart="never" nodeType="tmRoot"/>
+      </p:par>
+    </p:tnLst>
+  </p:timing>
+</p:sld>
+</file>
+
+<file path=ppt/slides/slide5.xml><?xml version="1.0" encoding="utf-8"?>
+<p:sld xmlns:a="http://schemas.openxmlformats.org/drawingml/2006/main" xmlns:r="http://schemas.openxmlformats.org/officeDocument/2006/relationships" xmlns:p="http://schemas.openxmlformats.org/presentationml/2006/main">
+  <p:cSld>
+    <p:spTree>
+      <p:nvGrpSpPr>
+        <p:cNvPr id="1" name=""/>
+        <p:cNvGrpSpPr/>
+        <p:nvPr/>
+      </p:nvGrpSpPr>
+      <p:grpSpPr>
+        <a:xfrm>
+          <a:off x="0" y="0"/>
+          <a:ext cx="0" cy="0"/>
+          <a:chOff x="0" y="0"/>
+          <a:chExt cx="0" cy="0"/>
+        </a:xfrm>
+      </p:grpSpPr>
+      <p:pic>
+        <p:nvPicPr>
+          <p:cNvPr id="2" name="Picture 1" descr="December.PNG"/>
+          <p:cNvPicPr>
+            <a:picLocks noChangeAspect="1"/>
+          </p:cNvPicPr>
+          <p:nvPr/>
+        </p:nvPicPr>
+        <p:blipFill>
+          <a:blip r:embed="rId2" cstate="print"/>
+          <a:stretch>
+            <a:fillRect/>
+          </a:stretch>
+        </p:blipFill>
+        <p:spPr>
+          <a:xfrm>
+            <a:off x="1" y="0"/>
+            <a:ext cx="9220200" cy="6858000"/>
+          </a:xfrm>
+          <a:prstGeom prst="rect">
+            <a:avLst/>
+          </a:prstGeom>
+        </p:spPr>
+      </p:pic>
+    </p:spTree>
+  </p:cSld>
+  <p:clrMapOvr>
+    <a:masterClrMapping/>
+  </p:clrMapOvr>
+  <p:timing>
+    <p:tnLst>
+      <p:par>
+        <p:cTn id="1" dur="indefinite" restart="never" nodeType="tmRoot"/>
+      </p:par>
+    </p:tnLst>
+  </p:timing>
+</p:sld>
+</file>
+
+<file path=ppt/slides/slide6.xml><?xml version="1.0" encoding="utf-8"?>
+<p:sld xmlns:a="http://schemas.openxmlformats.org/drawingml/2006/main" xmlns:r="http://schemas.openxmlformats.org/officeDocument/2006/relationships" xmlns:p="http://schemas.openxmlformats.org/presentationml/2006/main">
+  <p:cSld>
+    <p:spTree>
+      <p:nvGrpSpPr>
+        <p:cNvPr id="1" name=""/>
+        <p:cNvGrpSpPr/>
+        <p:nvPr/>
+      </p:nvGrpSpPr>
+      <p:grpSpPr>
+        <a:xfrm>
+          <a:off x="0" y="0"/>
+          <a:ext cx="0" cy="0"/>
+          <a:chOff x="0" y="0"/>
+          <a:chExt cx="0" cy="0"/>
+        </a:xfrm>
+      </p:grpSpPr>
+      <p:pic>
+        <p:nvPicPr>
+          <p:cNvPr id="2" name="Picture 1" descr="January.PNG"/>
+          <p:cNvPicPr>
+            <a:picLocks noChangeAspect="1"/>
+          </p:cNvPicPr>
+          <p:nvPr/>
+        </p:nvPicPr>
+        <p:blipFill>
+          <a:blip r:embed="rId2" cstate="print"/>
+          <a:stretch>
+            <a:fillRect/>
+          </a:stretch>
+        </p:blipFill>
+        <p:spPr>
+          <a:xfrm>
+            <a:off x="-20503" y="1"/>
+            <a:ext cx="9164503" cy="7010399"/>
+          </a:xfrm>
+          <a:prstGeom prst="rect">
+            <a:avLst/>
+          </a:prstGeom>
+        </p:spPr>
+      </p:pic>
+    </p:spTree>
+  </p:cSld>
+  <p:clrMapOvr>
+    <a:masterClrMapping/>
+  </p:clrMapOvr>
+  <p:timing>
+    <p:tnLst>
+      <p:par>
+        <p:cTn id="1" dur="indefinite" restart="never" nodeType="tmRoot"/>
+      </p:par>
+    </p:tnLst>
+  </p:timing>
+</p:sld>
+</file>
+
+<file path=ppt/slides/slide7.xml><?xml version="1.0" encoding="utf-8"?>
+<p:sld xmlns:a="http://schemas.openxmlformats.org/drawingml/2006/main" xmlns:r="http://schemas.openxmlformats.org/officeDocument/2006/relationships" xmlns:p="http://schemas.openxmlformats.org/presentationml/2006/main">
+  <p:cSld>
+    <p:spTree>
+      <p:nvGrpSpPr>
+        <p:cNvPr id="1" name=""/>
+        <p:cNvGrpSpPr/>
+        <p:nvPr/>
+      </p:nvGrpSpPr>
+      <p:grpSpPr>
+        <a:xfrm>
+          <a:off x="0" y="0"/>
+          <a:ext cx="0" cy="0"/>
+          <a:chOff x="0" y="0"/>
+          <a:chExt cx="0" cy="0"/>
+        </a:xfrm>
+      </p:grpSpPr>
+      <p:pic>
+        <p:nvPicPr>
+          <p:cNvPr id="2" name="Picture 1" descr="February.PNG"/>
+          <p:cNvPicPr>
+            <a:picLocks noChangeAspect="1"/>
+          </p:cNvPicPr>
+          <p:nvPr/>
+        </p:nvPicPr>
+        <p:blipFill>
+          <a:blip r:embed="rId2" cstate="print"/>
+          <a:stretch>
+            <a:fillRect/>
+          </a:stretch>
+        </p:blipFill>
+        <p:spPr>
+          <a:xfrm>
+            <a:off x="1" y="0"/>
+            <a:ext cx="9220200" cy="6858000"/>
+          </a:xfrm>
+          <a:prstGeom prst="rect">
+            <a:avLst/>
+          </a:prstGeom>
+        </p:spPr>
+      </p:pic>
+    </p:spTree>
+  </p:cSld>
+  <p:clrMapOvr>
+    <a:masterClrMapping/>
+  </p:clrMapOvr>
+  <p:timing>
+    <p:tnLst>
+      <p:par>
+        <p:cTn id="1" dur="indefinite" restart="never" nodeType="tmRoot"/>
+      </p:par>
+    </p:tnLst>
+  </p:timing>
+</p:sld>
+</file>
+
+<file path=ppt/slides/slide8.xml><?xml version="1.0" encoding="utf-8"?>
+<p:sld xmlns:a="http://schemas.openxmlformats.org/drawingml/2006/main" xmlns:r="http://schemas.openxmlformats.org/officeDocument/2006/relationships" xmlns:p="http://schemas.openxmlformats.org/presentationml/2006/main">
+  <p:cSld>
+    <p:spTree>
+      <p:nvGrpSpPr>
+        <p:cNvPr id="1" name=""/>
+        <p:cNvGrpSpPr/>
+        <p:nvPr/>
+      </p:nvGrpSpPr>
+      <p:grpSpPr>
+        <a:xfrm>
+          <a:off x="0" y="0"/>
+          <a:ext cx="0" cy="0"/>
+          <a:chOff x="0" y="0"/>
+          <a:chExt cx="0" cy="0"/>
+        </a:xfrm>
+      </p:grpSpPr>
+      <p:pic>
+        <p:nvPicPr>
+          <p:cNvPr id="2" name="Picture 1" descr="March.PNG"/>
+          <p:cNvPicPr>
+            <a:picLocks noChangeAspect="1"/>
+          </p:cNvPicPr>
+          <p:nvPr/>
+        </p:nvPicPr>
+        <p:blipFill>
+          <a:blip r:embed="rId2" cstate="print"/>
+          <a:stretch>
+            <a:fillRect/>
+          </a:stretch>
+        </p:blipFill>
+        <p:spPr>
+          <a:xfrm>
+            <a:off x="-48282" y="0"/>
+            <a:ext cx="9192282" cy="6858000"/>
+          </a:xfrm>
+          <a:prstGeom prst="rect">
+            <a:avLst/>
+          </a:prstGeom>
         </p:spPr>
       </p:pic>
     </p:spTree>

</xml_diff>